<commit_message>
moved the variability section to researchavenues
</commit_message>
<xml_diff>
--- a/understanding/figures/maxUtf.pptx
+++ b/understanding/figures/maxUtf.pptx
@@ -289,7 +289,7 @@
             <a:fld id="{1D8BD707-D9CF-40AE-B4C6-C98DA3205C09}" type="datetimeFigureOut">
               <a:rPr lang="en-US" smtClean="0"/>
               <a:pPr/>
-              <a:t>3/19/2014</a:t>
+              <a:t>14/12/14</a:t>
             </a:fld>
             <a:endParaRPr lang="en-US"/>
           </a:p>
@@ -456,7 +456,7 @@
             <a:fld id="{1D8BD707-D9CF-40AE-B4C6-C98DA3205C09}" type="datetimeFigureOut">
               <a:rPr lang="en-US" smtClean="0"/>
               <a:pPr/>
-              <a:t>3/19/2014</a:t>
+              <a:t>14/12/14</a:t>
             </a:fld>
             <a:endParaRPr lang="en-US"/>
           </a:p>
@@ -633,7 +633,7 @@
             <a:fld id="{1D8BD707-D9CF-40AE-B4C6-C98DA3205C09}" type="datetimeFigureOut">
               <a:rPr lang="en-US" smtClean="0"/>
               <a:pPr/>
-              <a:t>3/19/2014</a:t>
+              <a:t>14/12/14</a:t>
             </a:fld>
             <a:endParaRPr lang="en-US"/>
           </a:p>
@@ -800,7 +800,7 @@
             <a:fld id="{1D8BD707-D9CF-40AE-B4C6-C98DA3205C09}" type="datetimeFigureOut">
               <a:rPr lang="en-US" smtClean="0"/>
               <a:pPr/>
-              <a:t>3/19/2014</a:t>
+              <a:t>14/12/14</a:t>
             </a:fld>
             <a:endParaRPr lang="en-US"/>
           </a:p>
@@ -1043,7 +1043,7 @@
             <a:fld id="{1D8BD707-D9CF-40AE-B4C6-C98DA3205C09}" type="datetimeFigureOut">
               <a:rPr lang="en-US" smtClean="0"/>
               <a:pPr/>
-              <a:t>3/19/2014</a:t>
+              <a:t>14/12/14</a:t>
             </a:fld>
             <a:endParaRPr lang="en-US"/>
           </a:p>
@@ -1328,7 +1328,7 @@
             <a:fld id="{1D8BD707-D9CF-40AE-B4C6-C98DA3205C09}" type="datetimeFigureOut">
               <a:rPr lang="en-US" smtClean="0"/>
               <a:pPr/>
-              <a:t>3/19/2014</a:t>
+              <a:t>14/12/14</a:t>
             </a:fld>
             <a:endParaRPr lang="en-US"/>
           </a:p>
@@ -1747,7 +1747,7 @@
             <a:fld id="{1D8BD707-D9CF-40AE-B4C6-C98DA3205C09}" type="datetimeFigureOut">
               <a:rPr lang="en-US" smtClean="0"/>
               <a:pPr/>
-              <a:t>3/19/2014</a:t>
+              <a:t>14/12/14</a:t>
             </a:fld>
             <a:endParaRPr lang="en-US"/>
           </a:p>
@@ -1862,7 +1862,7 @@
             <a:fld id="{1D8BD707-D9CF-40AE-B4C6-C98DA3205C09}" type="datetimeFigureOut">
               <a:rPr lang="en-US" smtClean="0"/>
               <a:pPr/>
-              <a:t>3/19/2014</a:t>
+              <a:t>14/12/14</a:t>
             </a:fld>
             <a:endParaRPr lang="en-US"/>
           </a:p>
@@ -1954,7 +1954,7 @@
             <a:fld id="{1D8BD707-D9CF-40AE-B4C6-C98DA3205C09}" type="datetimeFigureOut">
               <a:rPr lang="en-US" smtClean="0"/>
               <a:pPr/>
-              <a:t>3/19/2014</a:t>
+              <a:t>14/12/14</a:t>
             </a:fld>
             <a:endParaRPr lang="en-US"/>
           </a:p>
@@ -2228,7 +2228,7 @@
             <a:fld id="{1D8BD707-D9CF-40AE-B4C6-C98DA3205C09}" type="datetimeFigureOut">
               <a:rPr lang="en-US" smtClean="0"/>
               <a:pPr/>
-              <a:t>3/19/2014</a:t>
+              <a:t>14/12/14</a:t>
             </a:fld>
             <a:endParaRPr lang="en-US"/>
           </a:p>
@@ -2478,7 +2478,7 @@
             <a:fld id="{1D8BD707-D9CF-40AE-B4C6-C98DA3205C09}" type="datetimeFigureOut">
               <a:rPr lang="en-US" smtClean="0"/>
               <a:pPr/>
-              <a:t>3/19/2014</a:t>
+              <a:t>14/12/14</a:t>
             </a:fld>
             <a:endParaRPr lang="en-US"/>
           </a:p>
@@ -2688,7 +2688,7 @@
             <a:fld id="{1D8BD707-D9CF-40AE-B4C6-C98DA3205C09}" type="datetimeFigureOut">
               <a:rPr lang="en-US" smtClean="0"/>
               <a:pPr/>
-              <a:t>3/19/2014</a:t>
+              <a:t>14/12/14</a:t>
             </a:fld>
             <a:endParaRPr lang="en-US"/>
           </a:p>
@@ -3256,18 +3256,7 @@
                 <a:ea typeface="ＭＳ Ｐゴシック" charset="-128"/>
                 <a:cs typeface="Calibri" pitchFamily="34" charset="0"/>
               </a:rPr>
-              <a:t>icrosimulation </a:t>
-            </a:r>
-            <a:r>
-              <a:rPr lang="en-US" b="1" smtClean="0">
-                <a:solidFill>
-                  <a:srgbClr val="3B3B3B"/>
-                </a:solidFill>
-                <a:latin typeface="Calibri" pitchFamily="34" charset="0"/>
-                <a:ea typeface="ＭＳ Ｐゴシック" charset="-128"/>
-                <a:cs typeface="Calibri" pitchFamily="34" charset="0"/>
-              </a:rPr>
-              <a:t>core</a:t>
+              <a:t>icrosimulation core</a:t>
             </a:r>
             <a:endParaRPr lang="en-US" b="1" dirty="0">
               <a:solidFill>
@@ -3529,7 +3518,7 @@
         <p:spPr>
           <a:xfrm>
             <a:off x="5355868" y="3947947"/>
-            <a:ext cx="1" cy="766620"/>
+            <a:ext cx="1" cy="700253"/>
           </a:xfrm>
           <a:prstGeom prst="straightConnector1">
             <a:avLst/>
@@ -4183,7 +4172,7 @@
         <p:spPr>
           <a:xfrm>
             <a:off x="5867400" y="3259677"/>
-            <a:ext cx="0" cy="1454890"/>
+            <a:ext cx="0" cy="1388523"/>
           </a:xfrm>
           <a:prstGeom prst="straightConnector1">
             <a:avLst/>
@@ -4412,8 +4401,8 @@
         </p:nvSpPr>
         <p:spPr bwMode="auto">
           <a:xfrm>
-            <a:off x="4633065" y="4714567"/>
-            <a:ext cx="1445607" cy="531670"/>
+            <a:off x="4633065" y="4648200"/>
+            <a:ext cx="1445607" cy="685800"/>
           </a:xfrm>
           <a:prstGeom prst="roundRect">
             <a:avLst>
@@ -4454,7 +4443,7 @@
             </a:r>
             <a:r>
               <a:rPr lang="de-CH" sz="1600" dirty="0" err="1" smtClean="0"/>
-              <a:t>load</a:t>
+              <a:t>loading</a:t>
             </a:r>
             <a:r>
               <a:rPr lang="de-CH" sz="1600" dirty="0" smtClean="0"/>
@@ -4480,7 +4469,7 @@
         <p:spPr>
           <a:xfrm flipH="1" flipV="1">
             <a:off x="4355243" y="4972806"/>
-            <a:ext cx="277822" cy="7596"/>
+            <a:ext cx="277822" cy="18294"/>
           </a:xfrm>
           <a:prstGeom prst="straightConnector1">
             <a:avLst/>
@@ -4599,6 +4588,45 @@
           </a:p>
         </p:txBody>
       </p:sp>
+      <p:cxnSp>
+        <p:nvCxnSpPr>
+          <p:cNvPr id="51" name="Straight Arrow Connector 50"/>
+          <p:cNvCxnSpPr/>
+          <p:nvPr/>
+        </p:nvCxnSpPr>
+        <p:spPr>
+          <a:xfrm rot="10800000" flipV="1">
+            <a:off x="3346452" y="3200402"/>
+            <a:ext cx="1682748" cy="1530346"/>
+          </a:xfrm>
+          <a:prstGeom prst="bentConnector3">
+            <a:avLst>
+              <a:gd name="adj1" fmla="val 98761"/>
+            </a:avLst>
+          </a:prstGeom>
+          <a:ln w="25400">
+            <a:solidFill>
+              <a:schemeClr val="tx1"/>
+            </a:solidFill>
+            <a:prstDash val="solid"/>
+            <a:tailEnd type="arrow"/>
+          </a:ln>
+        </p:spPr>
+        <p:style>
+          <a:lnRef idx="1">
+            <a:schemeClr val="accent1"/>
+          </a:lnRef>
+          <a:fillRef idx="0">
+            <a:schemeClr val="accent1"/>
+          </a:fillRef>
+          <a:effectRef idx="0">
+            <a:schemeClr val="accent1"/>
+          </a:effectRef>
+          <a:fontRef idx="minor">
+            <a:schemeClr val="tx1"/>
+          </a:fontRef>
+        </p:style>
+      </p:cxnSp>
     </p:spTree>
     <p:extLst>
       <p:ext uri="{BB962C8B-B14F-4D97-AF65-F5344CB8AC3E}">

</xml_diff>